<commit_message>
fix: Fixed the example route having errors in the final done callback
</commit_message>
<xml_diff>
--- a/node.jSTL #7 - Testing, Mocha, Chai, and you!.pptx
+++ b/node.jSTL #7 - Testing, Mocha, Chai, and you!.pptx
@@ -4758,11 +4758,6 @@
               </a:rPr>
               <a:t>A quite unremarkable Express route</a:t>
             </a:r>
-            <a:endParaRPr lang="en-US" sz="2400" dirty="0">
-              <a:solidFill>
-                <a:schemeClr val="bg1"/>
-              </a:solidFill>
-            </a:endParaRPr>
           </a:p>
         </p:txBody>
       </p:sp>
@@ -4822,7 +4817,7 @@
       </p:pic>
       <p:pic>
         <p:nvPicPr>
-          <p:cNvPr id="6147" name="Picture 3"/>
+          <p:cNvPr id="1026" name="Picture 2"/>
           <p:cNvPicPr>
             <a:picLocks noChangeAspect="1" noChangeArrowheads="1"/>
           </p:cNvPicPr>
@@ -4843,8 +4838,8 @@
         </p:blipFill>
         <p:spPr bwMode="auto">
           <a:xfrm>
-            <a:off x="4633400" y="2685892"/>
-            <a:ext cx="4510600" cy="4172108"/>
+            <a:off x="4648200" y="2764612"/>
+            <a:ext cx="4490921" cy="4093388"/>
           </a:xfrm>
           <a:prstGeom prst="rect">
             <a:avLst/>
@@ -5759,11 +5754,6 @@
               </a:rPr>
               <a:t>For reference – our entirely unremarkable Express route</a:t>
             </a:r>
-            <a:endParaRPr lang="en-US" sz="2400" dirty="0">
-              <a:solidFill>
-                <a:schemeClr val="bg1"/>
-              </a:solidFill>
-            </a:endParaRPr>
           </a:p>
         </p:txBody>
       </p:sp>
@@ -6852,11 +6842,6 @@
               </a:rPr>
               <a:t>Given a complex enough route, the logic can be broken out into an additional separate unit (I don’t do this much)</a:t>
             </a:r>
-            <a:endParaRPr lang="en-US" sz="1900" dirty="0" smtClean="0">
-              <a:solidFill>
-                <a:schemeClr val="bg1"/>
-              </a:solidFill>
-            </a:endParaRPr>
           </a:p>
           <a:p>
             <a:endParaRPr lang="en-US" dirty="0">
@@ -7227,15 +7212,7 @@
                   <a:schemeClr val="bg1"/>
                 </a:solidFill>
               </a:rPr>
-              <a:t>Dirty Dependency </a:t>
-            </a:r>
-            <a:r>
-              <a:rPr lang="en-US" dirty="0" smtClean="0">
-                <a:solidFill>
-                  <a:schemeClr val="bg1"/>
-                </a:solidFill>
-              </a:rPr>
-              <a:t>Injection</a:t>
+              <a:t>Dirty Dependency Injection</a:t>
             </a:r>
             <a:endParaRPr lang="en-US" dirty="0">
               <a:solidFill>

</xml_diff>

<commit_message>
fix: Fixed screenshot in second unmearkable express route
</commit_message>
<xml_diff>
--- a/node.jSTL #7 - Testing, Mocha, Chai, and you!.pptx
+++ b/node.jSTL #7 - Testing, Mocha, Chai, and you!.pptx
@@ -5813,7 +5813,7 @@
       </p:pic>
       <p:pic>
         <p:nvPicPr>
-          <p:cNvPr id="6147" name="Picture 3"/>
+          <p:cNvPr id="5" name="Picture 2"/>
           <p:cNvPicPr>
             <a:picLocks noChangeAspect="1" noChangeArrowheads="1"/>
           </p:cNvPicPr>
@@ -5834,8 +5834,8 @@
         </p:blipFill>
         <p:spPr bwMode="auto">
           <a:xfrm>
-            <a:off x="4633400" y="2685892"/>
-            <a:ext cx="4510600" cy="4172108"/>
+            <a:off x="4648200" y="2764612"/>
+            <a:ext cx="4490921" cy="4093388"/>
           </a:xfrm>
           <a:prstGeom prst="rect">
             <a:avLst/>

</xml_diff>

<commit_message>
fix: Fixed the after/before example on the second to last slide
</commit_message>
<xml_diff>
--- a/node.jSTL #7 - Testing, Mocha, Chai, and you!.pptx
+++ b/node.jSTL #7 - Testing, Mocha, Chai, and you!.pptx
@@ -7691,9 +7691,87 @@
           </a:p>
         </p:txBody>
       </p:sp>
+      <p:sp>
+        <p:nvSpPr>
+          <p:cNvPr id="3" name="TextBox 2"/>
+          <p:cNvSpPr txBox="1"/>
+          <p:nvPr/>
+        </p:nvSpPr>
+        <p:spPr>
+          <a:xfrm>
+            <a:off x="731471" y="5867400"/>
+            <a:ext cx="7345729" cy="523220"/>
+          </a:xfrm>
+          <a:prstGeom prst="rect">
+            <a:avLst/>
+          </a:prstGeom>
+          <a:noFill/>
+        </p:spPr>
+        <p:txBody>
+          <a:bodyPr wrap="none" rtlCol="0">
+            <a:spAutoFit/>
+          </a:bodyPr>
+          <a:lstStyle/>
+          <a:p>
+            <a:r>
+              <a:rPr lang="en-US" sz="2800" dirty="0" smtClean="0">
+                <a:solidFill>
+                  <a:schemeClr val="bg1"/>
+                </a:solidFill>
+              </a:rPr>
+              <a:t>before	</a:t>
+            </a:r>
+            <a:r>
+              <a:rPr lang="en-US" sz="2800" dirty="0" err="1" smtClean="0">
+                <a:solidFill>
+                  <a:schemeClr val="bg1"/>
+                </a:solidFill>
+              </a:rPr>
+              <a:t>beforeEach</a:t>
+            </a:r>
+            <a:r>
+              <a:rPr lang="en-US" sz="2800" dirty="0">
+                <a:solidFill>
+                  <a:schemeClr val="bg1"/>
+                </a:solidFill>
+              </a:rPr>
+              <a:t>	</a:t>
+            </a:r>
+            <a:r>
+              <a:rPr lang="en-US" sz="2800" dirty="0" smtClean="0">
+                <a:solidFill>
+                  <a:schemeClr val="bg1"/>
+                </a:solidFill>
+              </a:rPr>
+              <a:t>	</a:t>
+            </a:r>
+            <a:r>
+              <a:rPr lang="en-US" sz="2800" dirty="0" err="1" smtClean="0">
+                <a:solidFill>
+                  <a:schemeClr val="bg1"/>
+                </a:solidFill>
+              </a:rPr>
+              <a:t>afterEach</a:t>
+            </a:r>
+            <a:r>
+              <a:rPr lang="en-US" sz="2800" dirty="0" smtClean="0">
+                <a:solidFill>
+                  <a:schemeClr val="bg1"/>
+                </a:solidFill>
+              </a:rPr>
+              <a:t>	after</a:t>
+            </a:r>
+            <a:endParaRPr lang="en-US" sz="2800" dirty="0">
+              <a:solidFill>
+                <a:schemeClr val="bg1"/>
+              </a:solidFill>
+            </a:endParaRPr>
+          </a:p>
+        </p:txBody>
+      </p:sp>
       <p:pic>
         <p:nvPicPr>
-          <p:cNvPr id="12290" name="Picture 2"/>
+          <p:cNvPr id="2050" name="Picture 2"/>
           <p:cNvPicPr>
             <a:picLocks noChangeAspect="1" noChangeArrowheads="1"/>
           </p:cNvPicPr>
@@ -7714,8 +7792,8 @@
         </p:blipFill>
         <p:spPr bwMode="auto">
           <a:xfrm>
-            <a:off x="1287304" y="1219200"/>
-            <a:ext cx="6637496" cy="3468053"/>
+            <a:off x="1571625" y="1219200"/>
+            <a:ext cx="6000750" cy="3138487"/>
           </a:xfrm>
           <a:prstGeom prst="rect">
             <a:avLst/>
@@ -7745,84 +7823,6 @@
           </a:extLst>
         </p:spPr>
       </p:pic>
-      <p:sp>
-        <p:nvSpPr>
-          <p:cNvPr id="3" name="TextBox 2"/>
-          <p:cNvSpPr txBox="1"/>
-          <p:nvPr/>
-        </p:nvSpPr>
-        <p:spPr>
-          <a:xfrm>
-            <a:off x="731471" y="5867400"/>
-            <a:ext cx="7345729" cy="523220"/>
-          </a:xfrm>
-          <a:prstGeom prst="rect">
-            <a:avLst/>
-          </a:prstGeom>
-          <a:noFill/>
-        </p:spPr>
-        <p:txBody>
-          <a:bodyPr wrap="none" rtlCol="0">
-            <a:spAutoFit/>
-          </a:bodyPr>
-          <a:lstStyle/>
-          <a:p>
-            <a:r>
-              <a:rPr lang="en-US" sz="2800" dirty="0" smtClean="0">
-                <a:solidFill>
-                  <a:schemeClr val="bg1"/>
-                </a:solidFill>
-              </a:rPr>
-              <a:t>before	</a:t>
-            </a:r>
-            <a:r>
-              <a:rPr lang="en-US" sz="2800" dirty="0" err="1" smtClean="0">
-                <a:solidFill>
-                  <a:schemeClr val="bg1"/>
-                </a:solidFill>
-              </a:rPr>
-              <a:t>beforeEach</a:t>
-            </a:r>
-            <a:r>
-              <a:rPr lang="en-US" sz="2800" dirty="0">
-                <a:solidFill>
-                  <a:schemeClr val="bg1"/>
-                </a:solidFill>
-              </a:rPr>
-              <a:t>	</a:t>
-            </a:r>
-            <a:r>
-              <a:rPr lang="en-US" sz="2800" dirty="0" smtClean="0">
-                <a:solidFill>
-                  <a:schemeClr val="bg1"/>
-                </a:solidFill>
-              </a:rPr>
-              <a:t>	</a:t>
-            </a:r>
-            <a:r>
-              <a:rPr lang="en-US" sz="2800" dirty="0" err="1" smtClean="0">
-                <a:solidFill>
-                  <a:schemeClr val="bg1"/>
-                </a:solidFill>
-              </a:rPr>
-              <a:t>afterEach</a:t>
-            </a:r>
-            <a:r>
-              <a:rPr lang="en-US" sz="2800" dirty="0" smtClean="0">
-                <a:solidFill>
-                  <a:schemeClr val="bg1"/>
-                </a:solidFill>
-              </a:rPr>
-              <a:t>	after</a:t>
-            </a:r>
-            <a:endParaRPr lang="en-US" sz="2800" dirty="0">
-              <a:solidFill>
-                <a:schemeClr val="bg1"/>
-              </a:solidFill>
-            </a:endParaRPr>
-          </a:p>
-        </p:txBody>
-      </p:sp>
     </p:spTree>
     <p:extLst>
       <p:ext uri="{BB962C8B-B14F-4D97-AF65-F5344CB8AC3E}">

</xml_diff>

<commit_message>
fix: node-http-mocks doesnt have an event emitter so you have to specfiy it
</commit_message>
<xml_diff>
--- a/node.jSTL #7 - Testing, Mocha, Chai, and you!.pptx
+++ b/node.jSTL #7 - Testing, Mocha, Chai, and you!.pptx
@@ -318,7 +318,7 @@
           <a:p>
             <a:fld id="{75A3C5B4-6199-4031-B143-8199622DDC1A}" type="datetimeFigureOut">
               <a:rPr lang="en-US" smtClean="0"/>
-              <a:t>2/20/2017</a:t>
+              <a:t>2/21/2017</a:t>
             </a:fld>
             <a:endParaRPr lang="en-US"/>
           </a:p>
@@ -488,7 +488,7 @@
           <a:p>
             <a:fld id="{75A3C5B4-6199-4031-B143-8199622DDC1A}" type="datetimeFigureOut">
               <a:rPr lang="en-US" smtClean="0"/>
-              <a:t>2/20/2017</a:t>
+              <a:t>2/21/2017</a:t>
             </a:fld>
             <a:endParaRPr lang="en-US"/>
           </a:p>
@@ -668,7 +668,7 @@
           <a:p>
             <a:fld id="{75A3C5B4-6199-4031-B143-8199622DDC1A}" type="datetimeFigureOut">
               <a:rPr lang="en-US" smtClean="0"/>
-              <a:t>2/20/2017</a:t>
+              <a:t>2/21/2017</a:t>
             </a:fld>
             <a:endParaRPr lang="en-US"/>
           </a:p>
@@ -838,7 +838,7 @@
           <a:p>
             <a:fld id="{75A3C5B4-6199-4031-B143-8199622DDC1A}" type="datetimeFigureOut">
               <a:rPr lang="en-US" smtClean="0"/>
-              <a:t>2/20/2017</a:t>
+              <a:t>2/21/2017</a:t>
             </a:fld>
             <a:endParaRPr lang="en-US"/>
           </a:p>
@@ -1084,7 +1084,7 @@
           <a:p>
             <a:fld id="{75A3C5B4-6199-4031-B143-8199622DDC1A}" type="datetimeFigureOut">
               <a:rPr lang="en-US" smtClean="0"/>
-              <a:t>2/20/2017</a:t>
+              <a:t>2/21/2017</a:t>
             </a:fld>
             <a:endParaRPr lang="en-US"/>
           </a:p>
@@ -1372,7 +1372,7 @@
           <a:p>
             <a:fld id="{75A3C5B4-6199-4031-B143-8199622DDC1A}" type="datetimeFigureOut">
               <a:rPr lang="en-US" smtClean="0"/>
-              <a:t>2/20/2017</a:t>
+              <a:t>2/21/2017</a:t>
             </a:fld>
             <a:endParaRPr lang="en-US"/>
           </a:p>
@@ -1794,7 +1794,7 @@
           <a:p>
             <a:fld id="{75A3C5B4-6199-4031-B143-8199622DDC1A}" type="datetimeFigureOut">
               <a:rPr lang="en-US" smtClean="0"/>
-              <a:t>2/20/2017</a:t>
+              <a:t>2/21/2017</a:t>
             </a:fld>
             <a:endParaRPr lang="en-US"/>
           </a:p>
@@ -1912,7 +1912,7 @@
           <a:p>
             <a:fld id="{75A3C5B4-6199-4031-B143-8199622DDC1A}" type="datetimeFigureOut">
               <a:rPr lang="en-US" smtClean="0"/>
-              <a:t>2/20/2017</a:t>
+              <a:t>2/21/2017</a:t>
             </a:fld>
             <a:endParaRPr lang="en-US"/>
           </a:p>
@@ -2007,7 +2007,7 @@
           <a:p>
             <a:fld id="{75A3C5B4-6199-4031-B143-8199622DDC1A}" type="datetimeFigureOut">
               <a:rPr lang="en-US" smtClean="0"/>
-              <a:t>2/20/2017</a:t>
+              <a:t>2/21/2017</a:t>
             </a:fld>
             <a:endParaRPr lang="en-US"/>
           </a:p>
@@ -2284,7 +2284,7 @@
           <a:p>
             <a:fld id="{75A3C5B4-6199-4031-B143-8199622DDC1A}" type="datetimeFigureOut">
               <a:rPr lang="en-US" smtClean="0"/>
-              <a:t>2/20/2017</a:t>
+              <a:t>2/21/2017</a:t>
             </a:fld>
             <a:endParaRPr lang="en-US"/>
           </a:p>
@@ -2537,7 +2537,7 @@
           <a:p>
             <a:fld id="{75A3C5B4-6199-4031-B143-8199622DDC1A}" type="datetimeFigureOut">
               <a:rPr lang="en-US" smtClean="0"/>
-              <a:t>2/20/2017</a:t>
+              <a:t>2/21/2017</a:t>
             </a:fld>
             <a:endParaRPr lang="en-US"/>
           </a:p>
@@ -2750,7 +2750,7 @@
           <a:p>
             <a:fld id="{75A3C5B4-6199-4031-B143-8199622DDC1A}" type="datetimeFigureOut">
               <a:rPr lang="en-US" smtClean="0"/>
-              <a:t>2/20/2017</a:t>
+              <a:t>2/21/2017</a:t>
             </a:fld>
             <a:endParaRPr lang="en-US"/>
           </a:p>
@@ -6633,14 +6633,14 @@
       </p:sp>
       <p:pic>
         <p:nvPicPr>
-          <p:cNvPr id="9218" name="Picture 2"/>
+          <p:cNvPr id="1026" name="Picture 2"/>
           <p:cNvPicPr>
             <a:picLocks noChangeAspect="1" noChangeArrowheads="1"/>
           </p:cNvPicPr>
           <p:nvPr/>
         </p:nvPicPr>
         <p:blipFill>
-          <a:blip r:embed="rId2" cstate="print">
+          <a:blip r:embed="rId2">
             <a:extLst>
               <a:ext uri="{28A0092B-C50C-407E-A947-70E740481C1C}">
                 <a14:useLocalDpi xmlns:a14="http://schemas.microsoft.com/office/drawing/2010/main" val="0"/>
@@ -6654,8 +6654,8 @@
         </p:blipFill>
         <p:spPr bwMode="auto">
           <a:xfrm>
-            <a:off x="2714232" y="607395"/>
-            <a:ext cx="3762768" cy="6022005"/>
+            <a:off x="2667000" y="585216"/>
+            <a:ext cx="3942409" cy="6159054"/>
           </a:xfrm>
           <a:prstGeom prst="rect">
             <a:avLst/>

</xml_diff>